<commit_message>
flyer, datasource and harvard atlas json update
</commit_message>
<xml_diff>
--- a/flyer.pptx
+++ b/flyer.pptx
@@ -208,7 +208,7 @@
           <a:p>
             <a:fld id="{B41AB753-39A2-4809-B736-C132C7F3292A}" type="datetimeFigureOut">
               <a:rPr lang="en-GB" smtClean="0"/>
-              <a:t>05/05/2021</a:t>
+              <a:t>20/05/2021</a:t>
             </a:fld>
             <a:endParaRPr lang="en-GB" dirty="0"/>
           </a:p>
@@ -691,7 +691,7 @@
           <a:p>
             <a:fld id="{2F81D968-6F62-41F4-AF08-86DAEDC4BD09}" type="datetimeFigureOut">
               <a:rPr lang="en-GB" smtClean="0"/>
-              <a:t>05/05/2021</a:t>
+              <a:t>20/05/2021</a:t>
             </a:fld>
             <a:endParaRPr lang="en-GB" dirty="0"/>
           </a:p>
@@ -861,7 +861,7 @@
           <a:p>
             <a:fld id="{2F81D968-6F62-41F4-AF08-86DAEDC4BD09}" type="datetimeFigureOut">
               <a:rPr lang="en-GB" smtClean="0"/>
-              <a:t>05/05/2021</a:t>
+              <a:t>20/05/2021</a:t>
             </a:fld>
             <a:endParaRPr lang="en-GB" dirty="0"/>
           </a:p>
@@ -1041,7 +1041,7 @@
           <a:p>
             <a:fld id="{2F81D968-6F62-41F4-AF08-86DAEDC4BD09}" type="datetimeFigureOut">
               <a:rPr lang="en-GB" smtClean="0"/>
-              <a:t>05/05/2021</a:t>
+              <a:t>20/05/2021</a:t>
             </a:fld>
             <a:endParaRPr lang="en-GB" dirty="0"/>
           </a:p>
@@ -1211,7 +1211,7 @@
           <a:p>
             <a:fld id="{2F81D968-6F62-41F4-AF08-86DAEDC4BD09}" type="datetimeFigureOut">
               <a:rPr lang="en-GB" smtClean="0"/>
-              <a:t>05/05/2021</a:t>
+              <a:t>20/05/2021</a:t>
             </a:fld>
             <a:endParaRPr lang="en-GB" dirty="0"/>
           </a:p>
@@ -1455,7 +1455,7 @@
           <a:p>
             <a:fld id="{2F81D968-6F62-41F4-AF08-86DAEDC4BD09}" type="datetimeFigureOut">
               <a:rPr lang="en-GB" smtClean="0"/>
-              <a:t>05/05/2021</a:t>
+              <a:t>20/05/2021</a:t>
             </a:fld>
             <a:endParaRPr lang="en-GB" dirty="0"/>
           </a:p>
@@ -1687,7 +1687,7 @@
           <a:p>
             <a:fld id="{2F81D968-6F62-41F4-AF08-86DAEDC4BD09}" type="datetimeFigureOut">
               <a:rPr lang="en-GB" smtClean="0"/>
-              <a:t>05/05/2021</a:t>
+              <a:t>20/05/2021</a:t>
             </a:fld>
             <a:endParaRPr lang="en-GB" dirty="0"/>
           </a:p>
@@ -2054,7 +2054,7 @@
           <a:p>
             <a:fld id="{2F81D968-6F62-41F4-AF08-86DAEDC4BD09}" type="datetimeFigureOut">
               <a:rPr lang="en-GB" smtClean="0"/>
-              <a:t>05/05/2021</a:t>
+              <a:t>20/05/2021</a:t>
             </a:fld>
             <a:endParaRPr lang="en-GB" dirty="0"/>
           </a:p>
@@ -2172,7 +2172,7 @@
           <a:p>
             <a:fld id="{2F81D968-6F62-41F4-AF08-86DAEDC4BD09}" type="datetimeFigureOut">
               <a:rPr lang="en-GB" smtClean="0"/>
-              <a:t>05/05/2021</a:t>
+              <a:t>20/05/2021</a:t>
             </a:fld>
             <a:endParaRPr lang="en-GB" dirty="0"/>
           </a:p>
@@ -2267,7 +2267,7 @@
           <a:p>
             <a:fld id="{2F81D968-6F62-41F4-AF08-86DAEDC4BD09}" type="datetimeFigureOut">
               <a:rPr lang="en-GB" smtClean="0"/>
-              <a:t>05/05/2021</a:t>
+              <a:t>20/05/2021</a:t>
             </a:fld>
             <a:endParaRPr lang="en-GB" dirty="0"/>
           </a:p>
@@ -2544,7 +2544,7 @@
           <a:p>
             <a:fld id="{2F81D968-6F62-41F4-AF08-86DAEDC4BD09}" type="datetimeFigureOut">
               <a:rPr lang="en-GB" smtClean="0"/>
-              <a:t>05/05/2021</a:t>
+              <a:t>20/05/2021</a:t>
             </a:fld>
             <a:endParaRPr lang="en-GB" dirty="0"/>
           </a:p>
@@ -2800,7 +2800,7 @@
           <a:p>
             <a:fld id="{2F81D968-6F62-41F4-AF08-86DAEDC4BD09}" type="datetimeFigureOut">
               <a:rPr lang="en-GB" smtClean="0"/>
-              <a:t>05/05/2021</a:t>
+              <a:t>20/05/2021</a:t>
             </a:fld>
             <a:endParaRPr lang="en-GB" dirty="0"/>
           </a:p>
@@ -3013,7 +3013,7 @@
           <a:p>
             <a:fld id="{2F81D968-6F62-41F4-AF08-86DAEDC4BD09}" type="datetimeFigureOut">
               <a:rPr lang="en-GB" smtClean="0"/>
-              <a:t>05/05/2021</a:t>
+              <a:t>20/05/2021</a:t>
             </a:fld>
             <a:endParaRPr lang="en-GB" dirty="0"/>
           </a:p>
@@ -3493,7 +3493,7 @@
         <p:spPr>
           <a:xfrm>
             <a:off x="836592" y="996170"/>
-            <a:ext cx="11596999" cy="584775"/>
+            <a:ext cx="10060283" cy="584775"/>
           </a:xfrm>
           <a:prstGeom prst="rect">
             <a:avLst/>
@@ -3644,7 +3644,7 @@
         </p:blipFill>
         <p:spPr>
           <a:xfrm>
-            <a:off x="16403305" y="252850"/>
+            <a:off x="16330153" y="252850"/>
             <a:ext cx="4666888" cy="2780272"/>
           </a:xfrm>
           <a:prstGeom prst="rect">
@@ -3666,8 +3666,8 @@
         </p:nvSpPr>
         <p:spPr>
           <a:xfrm>
-            <a:off x="16144403" y="13349631"/>
-            <a:ext cx="5274392" cy="523220"/>
+            <a:off x="16180979" y="13276479"/>
+            <a:ext cx="4087646" cy="523220"/>
           </a:xfrm>
           <a:prstGeom prst="rect">
             <a:avLst/>
@@ -3714,7 +3714,7 @@
         </p:nvSpPr>
         <p:spPr>
           <a:xfrm>
-            <a:off x="16144401" y="13780998"/>
+            <a:off x="16180977" y="13707846"/>
             <a:ext cx="5268545" cy="1323439"/>
           </a:xfrm>
           <a:prstGeom prst="rect">
@@ -3734,49 +3734,33 @@
                   <a:schemeClr val="bg1"/>
                 </a:solidFill>
               </a:rPr>
-              <a:t>[1]	</a:t>
-            </a:r>
-            <a:r>
-              <a:rPr lang="en-GB" sz="2000" dirty="0" err="1">
-                <a:solidFill>
-                  <a:schemeClr val="bg1"/>
-                </a:solidFill>
-              </a:rPr>
-              <a:t>Maaten</a:t>
-            </a:r>
+              <a:t>[1]	Ogawa et al. NAS. 1990, 9868-9872</a:t>
+            </a:r>
+          </a:p>
+          <a:p>
             <a:r>
               <a:rPr lang="en-GB" sz="2000" dirty="0">
                 <a:solidFill>
                   <a:schemeClr val="bg1"/>
                 </a:solidFill>
               </a:rPr>
-              <a:t> &amp; Hinton. JMLR. 2008, 2579-2605</a:t>
-            </a:r>
-          </a:p>
-          <a:p>
+              <a:t>[2]	Abraham et al. </a:t>
+            </a:r>
+            <a:r>
+              <a:rPr lang="en-GB" sz="2000" i="1" dirty="0">
+                <a:solidFill>
+                  <a:schemeClr val="bg1"/>
+                </a:solidFill>
+              </a:rPr>
+              <a:t>Frontiers</a:t>
+            </a:r>
             <a:r>
               <a:rPr lang="en-GB" sz="2000" dirty="0">
                 <a:solidFill>
                   <a:schemeClr val="bg1"/>
                 </a:solidFill>
               </a:rPr>
-              <a:t>[2]	</a:t>
-            </a:r>
-            <a:r>
-              <a:rPr lang="en-GB" sz="2000" dirty="0" err="1">
-                <a:solidFill>
-                  <a:schemeClr val="bg1"/>
-                </a:solidFill>
-              </a:rPr>
-              <a:t>Baccianella</a:t>
-            </a:r>
-            <a:r>
-              <a:rPr lang="en-GB" sz="2000" dirty="0">
-                <a:solidFill>
-                  <a:schemeClr val="bg1"/>
-                </a:solidFill>
-              </a:rPr>
-              <a:t> et al. ISDA. 2009, 283-287</a:t>
+              <a:t>. 2014, 14</a:t>
             </a:r>
           </a:p>
           <a:p>
@@ -3794,7 +3778,7 @@
                   <a:schemeClr val="bg1"/>
                 </a:solidFill>
               </a:rPr>
-              <a:t>Bouckaert</a:t>
+              <a:t>Wyeld</a:t>
             </a:r>
             <a:r>
               <a:rPr lang="en-GB" sz="2000" dirty="0">
@@ -3802,7 +3786,7 @@
                   <a:schemeClr val="bg1"/>
                 </a:solidFill>
               </a:rPr>
-              <a:t> &amp; Frank. KDDM. 2004, 3-12</a:t>
+              <a:t>. IEEE. 2005, 593-598</a:t>
             </a:r>
           </a:p>
           <a:p>
@@ -3812,7 +3796,23 @@
                   <a:schemeClr val="bg1"/>
                 </a:solidFill>
               </a:rPr>
-              <a:t>[4]	Ballard &amp; Wang. WCICA. 2016, 1021-1026</a:t>
+              <a:t>[4]	</a:t>
+            </a:r>
+            <a:r>
+              <a:rPr lang="en-GB" sz="2000" dirty="0" err="1">
+                <a:solidFill>
+                  <a:schemeClr val="bg1"/>
+                </a:solidFill>
+              </a:rPr>
+              <a:t>Moere</a:t>
+            </a:r>
+            <a:r>
+              <a:rPr lang="en-GB" sz="2000" dirty="0">
+                <a:solidFill>
+                  <a:schemeClr val="bg1"/>
+                </a:solidFill>
+              </a:rPr>
+              <a:t> &amp; Purchase. IV. 2011, 356-371</a:t>
             </a:r>
           </a:p>
         </p:txBody>
@@ -3867,8 +3867,8 @@
         </p:nvSpPr>
         <p:spPr>
           <a:xfrm rot="5400000">
-            <a:off x="398680" y="2367200"/>
-            <a:ext cx="5747219" cy="4637731"/>
+            <a:off x="-375115" y="3031264"/>
+            <a:ext cx="7294805" cy="4637731"/>
           </a:xfrm>
           <a:prstGeom prst="rect">
             <a:avLst/>
@@ -3919,14 +3919,14 @@
         </p:nvSpPr>
         <p:spPr>
           <a:xfrm rot="5400000">
-            <a:off x="6460799" y="5444779"/>
-            <a:ext cx="3782304" cy="4882229"/>
+            <a:off x="6417363" y="5326669"/>
+            <a:ext cx="3869171" cy="4882229"/>
           </a:xfrm>
           <a:prstGeom prst="rect">
             <a:avLst/>
           </a:prstGeom>
           <a:solidFill>
-            <a:srgbClr val="E9ECEF"/>
+            <a:srgbClr val="DC3545"/>
           </a:solidFill>
           <a:ln>
             <a:noFill/>
@@ -3971,8 +3971,8 @@
         </p:nvSpPr>
         <p:spPr>
           <a:xfrm rot="5400000">
-            <a:off x="10762396" y="2209178"/>
-            <a:ext cx="5433644" cy="4637730"/>
+            <a:off x="11093490" y="1682404"/>
+            <a:ext cx="4685503" cy="4723683"/>
           </a:xfrm>
           <a:prstGeom prst="rect">
             <a:avLst/>
@@ -4009,36 +4009,6 @@
           </a:p>
         </p:txBody>
       </p:sp>
-      <p:pic>
-        <p:nvPicPr>
-          <p:cNvPr id="9" name="Picture 8">
-            <a:extLst>
-              <a:ext uri="{FF2B5EF4-FFF2-40B4-BE49-F238E27FC236}">
-                <a16:creationId xmlns:a16="http://schemas.microsoft.com/office/drawing/2014/main" id="{599640F6-0455-48CD-8FC0-28E8CFC7A398}"/>
-              </a:ext>
-            </a:extLst>
-          </p:cNvPr>
-          <p:cNvPicPr>
-            <a:picLocks noChangeAspect="1"/>
-          </p:cNvPicPr>
-          <p:nvPr/>
-        </p:nvPicPr>
-        <p:blipFill>
-          <a:blip r:embed="rId4"/>
-          <a:stretch>
-            <a:fillRect/>
-          </a:stretch>
-        </p:blipFill>
-        <p:spPr>
-          <a:xfrm>
-            <a:off x="21691857" y="5177699"/>
-            <a:ext cx="4882230" cy="4125439"/>
-          </a:xfrm>
-          <a:prstGeom prst="rect">
-            <a:avLst/>
-          </a:prstGeom>
-        </p:spPr>
-      </p:pic>
       <p:sp>
         <p:nvSpPr>
           <p:cNvPr id="60" name="TextBox 59">
@@ -4080,36 +4050,6 @@
           </a:p>
         </p:txBody>
       </p:sp>
-      <p:pic>
-        <p:nvPicPr>
-          <p:cNvPr id="10" name="Picture 9">
-            <a:extLst>
-              <a:ext uri="{FF2B5EF4-FFF2-40B4-BE49-F238E27FC236}">
-                <a16:creationId xmlns:a16="http://schemas.microsoft.com/office/drawing/2014/main" id="{0AEAA38D-7AFA-4BAC-8C7A-DC66B597D6B0}"/>
-              </a:ext>
-            </a:extLst>
-          </p:cNvPr>
-          <p:cNvPicPr>
-            <a:picLocks noChangeAspect="1"/>
-          </p:cNvPicPr>
-          <p:nvPr/>
-        </p:nvPicPr>
-        <p:blipFill>
-          <a:blip r:embed="rId5"/>
-          <a:stretch>
-            <a:fillRect/>
-          </a:stretch>
-        </p:blipFill>
-        <p:spPr>
-          <a:xfrm>
-            <a:off x="21755688" y="157600"/>
-            <a:ext cx="4754568" cy="4728299"/>
-          </a:xfrm>
-          <a:prstGeom prst="rect">
-            <a:avLst/>
-          </a:prstGeom>
-        </p:spPr>
-      </p:pic>
       <p:sp>
         <p:nvSpPr>
           <p:cNvPr id="61" name="TextBox 60">
@@ -4124,8 +4064,8 @@
         </p:nvSpPr>
         <p:spPr>
           <a:xfrm>
-            <a:off x="950511" y="1809598"/>
-            <a:ext cx="4584977" cy="492443"/>
+            <a:off x="950511" y="1699870"/>
+            <a:ext cx="3519889" cy="523220"/>
           </a:xfrm>
           <a:prstGeom prst="rect">
             <a:avLst/>
@@ -4139,11 +4079,11 @@
           <a:lstStyle/>
           <a:p>
             <a:r>
-              <a:rPr lang="en-GB" sz="2600" dirty="0">
+              <a:rPr lang="en-GB" sz="2800" dirty="0">
                 <a:latin typeface="Microsoft JhengHei UI" panose="020B0604030504040204" pitchFamily="34" charset="-120"/>
                 <a:ea typeface="Microsoft JhengHei UI" panose="020B0604030504040204" pitchFamily="34" charset="-120"/>
               </a:rPr>
-              <a:t>Background</a:t>
+              <a:t>Introduction</a:t>
             </a:r>
           </a:p>
         </p:txBody>
@@ -4204,14 +4144,14 @@
           <p:nvPr/>
         </p:nvPicPr>
         <p:blipFill>
-          <a:blip r:embed="rId6"/>
+          <a:blip r:embed="rId4"/>
           <a:stretch>
             <a:fillRect/>
           </a:stretch>
         </p:blipFill>
         <p:spPr>
           <a:xfrm>
-            <a:off x="5901751" y="1809598"/>
+            <a:off x="5901751" y="1699870"/>
             <a:ext cx="4868031" cy="3987935"/>
           </a:xfrm>
           <a:prstGeom prst="rect">
@@ -4234,14 +4174,14 @@
           <p:nvPr/>
         </p:nvPicPr>
         <p:blipFill>
-          <a:blip r:embed="rId7"/>
+          <a:blip r:embed="rId5"/>
           <a:stretch>
             <a:fillRect/>
           </a:stretch>
         </p:blipFill>
         <p:spPr>
           <a:xfrm>
-            <a:off x="5907508" y="10017957"/>
+            <a:off x="5907508" y="9908229"/>
             <a:ext cx="4868031" cy="4851186"/>
           </a:xfrm>
           <a:prstGeom prst="rect">
@@ -4263,8 +4203,8 @@
         </p:nvSpPr>
         <p:spPr>
           <a:xfrm>
-            <a:off x="5925034" y="6001198"/>
-            <a:ext cx="4584977" cy="492443"/>
+            <a:off x="5925034" y="5836601"/>
+            <a:ext cx="3981877" cy="492443"/>
           </a:xfrm>
           <a:prstGeom prst="rect">
             <a:avLst/>
@@ -4279,6 +4219,9 @@
           <a:p>
             <a:r>
               <a:rPr lang="en-GB" sz="2600" dirty="0">
+                <a:solidFill>
+                  <a:schemeClr val="bg1"/>
+                </a:solidFill>
                 <a:latin typeface="Microsoft JhengHei UI" panose="020B0604030504040204" pitchFamily="34" charset="-120"/>
                 <a:ea typeface="Microsoft JhengHei UI" panose="020B0604030504040204" pitchFamily="34" charset="-120"/>
               </a:rPr>
@@ -4289,10 +4232,79 @@
       </p:sp>
       <p:sp>
         <p:nvSpPr>
-          <p:cNvPr id="80" name="Rectangle 79">
+          <p:cNvPr id="82" name="TextBox 81">
             <a:extLst>
               <a:ext uri="{FF2B5EF4-FFF2-40B4-BE49-F238E27FC236}">
-                <a16:creationId xmlns:a16="http://schemas.microsoft.com/office/drawing/2014/main" id="{F3DEC01A-8917-4989-B486-A15182C49E65}"/>
+                <a16:creationId xmlns:a16="http://schemas.microsoft.com/office/drawing/2014/main" id="{3AFFE7C7-8ED6-4C0A-ABC0-F486C2B45F9F}"/>
+              </a:ext>
+            </a:extLst>
+          </p:cNvPr>
+          <p:cNvSpPr txBox="1"/>
+          <p:nvPr/>
+        </p:nvSpPr>
+        <p:spPr>
+          <a:xfrm>
+            <a:off x="963310" y="2171838"/>
+            <a:ext cx="4599102" cy="6863417"/>
+          </a:xfrm>
+          <a:prstGeom prst="rect">
+            <a:avLst/>
+          </a:prstGeom>
+          <a:noFill/>
+        </p:spPr>
+        <p:txBody>
+          <a:bodyPr wrap="square" rtlCol="0">
+            <a:spAutoFit/>
+          </a:bodyPr>
+          <a:lstStyle/>
+          <a:p>
+            <a:pPr algn="just"/>
+            <a:r>
+              <a:rPr lang="en-GB" sz="2000" dirty="0" err="1"/>
+              <a:t>BrainBoard</a:t>
+            </a:r>
+            <a:r>
+              <a:rPr lang="en-GB" sz="2000" dirty="0"/>
+              <a:t> is a collection of simple, 2D brain visualisations which afford the viewer a deeper understanding of the complex information contained in the functional MRI scan.  Functional MRI is a neuroimaging technique capable of capturing blood flow within the brain over time (BOLD signal). By combining this with structural information, we can compare the synchronicity of signals created by blood flow in particular brain regions, known as BOLD functional connectivity</a:t>
+            </a:r>
+            <a:r>
+              <a:rPr lang="en-GB" sz="2000" baseline="30000" dirty="0"/>
+              <a:t>[1]</a:t>
+            </a:r>
+            <a:r>
+              <a:rPr lang="en-GB" sz="2000" dirty="0"/>
+              <a:t>. Visualisations of this nature are of particular interest to neuroscientists as an explorative analysis and validation tool for brain connectivity.  Real world region coordinates and connection strengths can be computed and exported from </a:t>
+            </a:r>
+            <a:r>
+              <a:rPr lang="en-GB" sz="2000" dirty="0" err="1"/>
+              <a:t>Nilearn</a:t>
+            </a:r>
+            <a:r>
+              <a:rPr lang="en-GB" sz="2000" baseline="30000" dirty="0"/>
+              <a:t>[2]</a:t>
+            </a:r>
+            <a:r>
+              <a:rPr lang="en-GB" sz="2000" dirty="0"/>
+              <a:t> into a simple JSON format and uploaded to </a:t>
+            </a:r>
+            <a:r>
+              <a:rPr lang="en-GB" sz="2000" dirty="0" err="1"/>
+              <a:t>BrainBoard</a:t>
+            </a:r>
+            <a:r>
+              <a:rPr lang="en-GB" sz="2000" dirty="0"/>
+              <a:t> for visualisation. The plots generated are interactive to encourage exploration of the subject data.</a:t>
+            </a:r>
+            <a:endParaRPr lang="en-GB" sz="2000" baseline="30000" dirty="0"/>
+          </a:p>
+        </p:txBody>
+      </p:sp>
+      <p:sp>
+        <p:nvSpPr>
+          <p:cNvPr id="85" name="Arrow: Up 84">
+            <a:extLst>
+              <a:ext uri="{FF2B5EF4-FFF2-40B4-BE49-F238E27FC236}">
+                <a16:creationId xmlns:a16="http://schemas.microsoft.com/office/drawing/2014/main" id="{5C78A16E-476E-4258-BA27-87FFB8AFC72F}"/>
               </a:ext>
             </a:extLst>
           </p:cNvPr>
@@ -4300,15 +4312,18 @@
           <p:nvPr/>
         </p:nvSpPr>
         <p:spPr>
-          <a:xfrm rot="5400000">
-            <a:off x="22133189" y="10443419"/>
-            <a:ext cx="3999565" cy="4882229"/>
-          </a:xfrm>
-          <a:prstGeom prst="rect">
-            <a:avLst/>
+          <a:xfrm rot="10800000">
+            <a:off x="6056967" y="9806257"/>
+            <a:ext cx="316523" cy="523221"/>
+          </a:xfrm>
+          <a:prstGeom prst="upArrow">
+            <a:avLst>
+              <a:gd name="adj1" fmla="val 43981"/>
+              <a:gd name="adj2" fmla="val 50000"/>
+            </a:avLst>
           </a:prstGeom>
           <a:solidFill>
-            <a:srgbClr val="E9ECEF"/>
+            <a:srgbClr val="DC3545"/>
           </a:solidFill>
           <a:ln>
             <a:noFill/>
@@ -4335,52 +4350,16 @@
           <a:lstStyle/>
           <a:p>
             <a:pPr algn="ctr"/>
-            <a:endParaRPr lang="en-GB" dirty="0"/>
-          </a:p>
-        </p:txBody>
-      </p:sp>
-      <p:sp>
-        <p:nvSpPr>
-          <p:cNvPr id="82" name="TextBox 81">
+            <a:endParaRPr lang="en-GB"/>
+          </a:p>
+        </p:txBody>
+      </p:sp>
+      <p:sp>
+        <p:nvSpPr>
+          <p:cNvPr id="87" name="Arrow: Up 86">
             <a:extLst>
               <a:ext uri="{FF2B5EF4-FFF2-40B4-BE49-F238E27FC236}">
-                <a16:creationId xmlns:a16="http://schemas.microsoft.com/office/drawing/2014/main" id="{3AFFE7C7-8ED6-4C0A-ABC0-F486C2B45F9F}"/>
-              </a:ext>
-            </a:extLst>
-          </p:cNvPr>
-          <p:cNvSpPr txBox="1"/>
-          <p:nvPr/>
-        </p:nvSpPr>
-        <p:spPr>
-          <a:xfrm>
-            <a:off x="963310" y="2281566"/>
-            <a:ext cx="4627845" cy="369332"/>
-          </a:xfrm>
-          <a:prstGeom prst="rect">
-            <a:avLst/>
-          </a:prstGeom>
-          <a:noFill/>
-        </p:spPr>
-        <p:txBody>
-          <a:bodyPr wrap="square" rtlCol="0">
-            <a:spAutoFit/>
-          </a:bodyPr>
-          <a:lstStyle/>
-          <a:p>
-            <a:r>
-              <a:rPr lang="en-GB" dirty="0" err="1"/>
-              <a:t>dsf</a:t>
-            </a:r>
-            <a:endParaRPr lang="en-GB" dirty="0"/>
-          </a:p>
-        </p:txBody>
-      </p:sp>
-      <p:sp>
-        <p:nvSpPr>
-          <p:cNvPr id="85" name="Arrow: Up 84">
-            <a:extLst>
-              <a:ext uri="{FF2B5EF4-FFF2-40B4-BE49-F238E27FC236}">
-                <a16:creationId xmlns:a16="http://schemas.microsoft.com/office/drawing/2014/main" id="{5C78A16E-476E-4258-BA27-87FFB8AFC72F}"/>
+                <a16:creationId xmlns:a16="http://schemas.microsoft.com/office/drawing/2014/main" id="{73D9061B-2ACA-4636-A6CC-C580DDB7C5BE}"/>
               </a:ext>
             </a:extLst>
           </p:cNvPr>
@@ -4389,7 +4368,7 @@
         </p:nvSpPr>
         <p:spPr>
           <a:xfrm rot="10800000">
-            <a:off x="6056967" y="9861121"/>
+            <a:off x="10335850" y="9806257"/>
             <a:ext cx="316523" cy="523221"/>
           </a:xfrm>
           <a:prstGeom prst="upArrow">
@@ -4432,10 +4411,10 @@
       </p:sp>
       <p:sp>
         <p:nvSpPr>
-          <p:cNvPr id="87" name="Arrow: Up 86">
+          <p:cNvPr id="92" name="Arrow: Up 91">
             <a:extLst>
               <a:ext uri="{FF2B5EF4-FFF2-40B4-BE49-F238E27FC236}">
-                <a16:creationId xmlns:a16="http://schemas.microsoft.com/office/drawing/2014/main" id="{73D9061B-2ACA-4636-A6CC-C580DDB7C5BE}"/>
+                <a16:creationId xmlns:a16="http://schemas.microsoft.com/office/drawing/2014/main" id="{1995D40B-80F5-4B62-B11F-65AD1E75B074}"/>
               </a:ext>
             </a:extLst>
           </p:cNvPr>
@@ -4443,8 +4422,8 @@
           <p:nvPr/>
         </p:nvSpPr>
         <p:spPr>
-          <a:xfrm rot="10800000">
-            <a:off x="10335850" y="9861121"/>
+          <a:xfrm>
+            <a:off x="6056966" y="5211728"/>
             <a:ext cx="316523" cy="523221"/>
           </a:xfrm>
           <a:prstGeom prst="upArrow">
@@ -4487,10 +4466,10 @@
       </p:sp>
       <p:sp>
         <p:nvSpPr>
-          <p:cNvPr id="92" name="Arrow: Up 91">
+          <p:cNvPr id="93" name="Arrow: Up 92">
             <a:extLst>
               <a:ext uri="{FF2B5EF4-FFF2-40B4-BE49-F238E27FC236}">
-                <a16:creationId xmlns:a16="http://schemas.microsoft.com/office/drawing/2014/main" id="{1995D40B-80F5-4B62-B11F-65AD1E75B074}"/>
+                <a16:creationId xmlns:a16="http://schemas.microsoft.com/office/drawing/2014/main" id="{4BE22511-039D-46D7-A597-EA5869C63CD0}"/>
               </a:ext>
             </a:extLst>
           </p:cNvPr>
@@ -4499,7 +4478,7 @@
         </p:nvSpPr>
         <p:spPr>
           <a:xfrm>
-            <a:off x="6056966" y="5376320"/>
+            <a:off x="10349276" y="5226612"/>
             <a:ext cx="316523" cy="523221"/>
           </a:xfrm>
           <a:prstGeom prst="upArrow">
@@ -4542,10 +4521,103 @@
       </p:sp>
       <p:sp>
         <p:nvSpPr>
-          <p:cNvPr id="93" name="Arrow: Up 92">
+          <p:cNvPr id="27" name="TextBox 26">
             <a:extLst>
               <a:ext uri="{FF2B5EF4-FFF2-40B4-BE49-F238E27FC236}">
-                <a16:creationId xmlns:a16="http://schemas.microsoft.com/office/drawing/2014/main" id="{4BE22511-039D-46D7-A597-EA5869C63CD0}"/>
+                <a16:creationId xmlns:a16="http://schemas.microsoft.com/office/drawing/2014/main" id="{71C4EFDE-DA0E-47B4-A77B-301CD52C355B}"/>
+              </a:ext>
+            </a:extLst>
+          </p:cNvPr>
+          <p:cNvSpPr txBox="1"/>
+          <p:nvPr/>
+        </p:nvSpPr>
+        <p:spPr>
+          <a:xfrm>
+            <a:off x="5905687" y="6224494"/>
+            <a:ext cx="4862274" cy="3477875"/>
+          </a:xfrm>
+          <a:prstGeom prst="rect">
+            <a:avLst/>
+          </a:prstGeom>
+          <a:noFill/>
+        </p:spPr>
+        <p:txBody>
+          <a:bodyPr wrap="square" rtlCol="0">
+            <a:spAutoFit/>
+          </a:bodyPr>
+          <a:lstStyle/>
+          <a:p>
+            <a:pPr algn="just"/>
+            <a:r>
+              <a:rPr lang="en-GB" sz="2000" dirty="0" err="1">
+                <a:solidFill>
+                  <a:schemeClr val="bg1"/>
+                </a:solidFill>
+              </a:rPr>
+              <a:t>BrainBoard</a:t>
+            </a:r>
+            <a:r>
+              <a:rPr lang="en-GB" sz="2000" dirty="0">
+                <a:solidFill>
+                  <a:schemeClr val="bg1"/>
+                </a:solidFill>
+              </a:rPr>
+              <a:t> is designed such that interaction with any of the three visualisations results in a simulated reciprocal interaction in the other two.  This has the effect of displaying all three complementary views of some aspect of the data at the same time, strengthening the depth of prospective insights. Colours are synchronised across all three plots to retain visual consistency and accuracy of insights. </a:t>
+            </a:r>
+            <a:r>
+              <a:rPr lang="en-GB" sz="2000" b="1" dirty="0">
+                <a:solidFill>
+                  <a:schemeClr val="bg1"/>
+                </a:solidFill>
+              </a:rPr>
+              <a:t>Fig. 1, 2, 3 </a:t>
+            </a:r>
+            <a:r>
+              <a:rPr lang="en-GB" sz="2000" dirty="0">
+                <a:solidFill>
+                  <a:schemeClr val="bg1"/>
+                </a:solidFill>
+              </a:rPr>
+              <a:t>are mutually highlighting the Superior Parietal Lobule.</a:t>
+            </a:r>
+          </a:p>
+        </p:txBody>
+      </p:sp>
+      <p:pic>
+        <p:nvPicPr>
+          <p:cNvPr id="2" name="Picture 1">
+            <a:extLst>
+              <a:ext uri="{FF2B5EF4-FFF2-40B4-BE49-F238E27FC236}">
+                <a16:creationId xmlns:a16="http://schemas.microsoft.com/office/drawing/2014/main" id="{A8E43D5A-17B7-42AC-B29E-09A6335BB127}"/>
+              </a:ext>
+            </a:extLst>
+          </p:cNvPr>
+          <p:cNvPicPr>
+            <a:picLocks noChangeAspect="1"/>
+          </p:cNvPicPr>
+          <p:nvPr/>
+        </p:nvPicPr>
+        <p:blipFill rotWithShape="1">
+          <a:blip r:embed="rId6"/>
+          <a:srcRect r="2091"/>
+          <a:stretch/>
+        </p:blipFill>
+        <p:spPr>
+          <a:xfrm>
+            <a:off x="10896875" y="6627164"/>
+            <a:ext cx="5051495" cy="2458759"/>
+          </a:xfrm>
+          <a:prstGeom prst="rect">
+            <a:avLst/>
+          </a:prstGeom>
+        </p:spPr>
+      </p:pic>
+      <p:sp>
+        <p:nvSpPr>
+          <p:cNvPr id="30" name="Rectangle 29">
+            <a:extLst>
+              <a:ext uri="{FF2B5EF4-FFF2-40B4-BE49-F238E27FC236}">
+                <a16:creationId xmlns:a16="http://schemas.microsoft.com/office/drawing/2014/main" id="{53F730CC-0A81-4BAD-B4FC-5EC9CE9C7BF0}"/>
               </a:ext>
             </a:extLst>
           </p:cNvPr>
@@ -4553,18 +4625,15 @@
           <p:nvPr/>
         </p:nvSpPr>
         <p:spPr>
-          <a:xfrm>
-            <a:off x="10349276" y="5372916"/>
-            <a:ext cx="316523" cy="523221"/>
-          </a:xfrm>
-          <a:prstGeom prst="upArrow">
-            <a:avLst>
-              <a:gd name="adj1" fmla="val 43981"/>
-              <a:gd name="adj2" fmla="val 50000"/>
-            </a:avLst>
+          <a:xfrm rot="5400000">
+            <a:off x="539612" y="9731405"/>
+            <a:ext cx="5480305" cy="4637732"/>
+          </a:xfrm>
+          <a:prstGeom prst="rect">
+            <a:avLst/>
           </a:prstGeom>
           <a:solidFill>
-            <a:srgbClr val="DC3545"/>
+            <a:srgbClr val="E9ECEF"/>
           </a:solidFill>
           <a:ln>
             <a:noFill/>
@@ -4591,7 +4660,697 @@
           <a:lstStyle/>
           <a:p>
             <a:pPr algn="ctr"/>
-            <a:endParaRPr lang="en-GB"/>
+            <a:r>
+              <a:rPr lang="en-GB" dirty="0"/>
+              <a:t>c</a:t>
+            </a:r>
+          </a:p>
+        </p:txBody>
+      </p:sp>
+      <p:sp>
+        <p:nvSpPr>
+          <p:cNvPr id="31" name="TextBox 30">
+            <a:extLst>
+              <a:ext uri="{FF2B5EF4-FFF2-40B4-BE49-F238E27FC236}">
+                <a16:creationId xmlns:a16="http://schemas.microsoft.com/office/drawing/2014/main" id="{DCD15FEC-CF04-46E3-B573-2EE25B49E8EA}"/>
+              </a:ext>
+            </a:extLst>
+          </p:cNvPr>
+          <p:cNvSpPr txBox="1"/>
+          <p:nvPr/>
+        </p:nvSpPr>
+        <p:spPr>
+          <a:xfrm>
+            <a:off x="978987" y="9265535"/>
+            <a:ext cx="3704773" cy="523220"/>
+          </a:xfrm>
+          <a:prstGeom prst="rect">
+            <a:avLst/>
+          </a:prstGeom>
+          <a:noFill/>
+        </p:spPr>
+        <p:txBody>
+          <a:bodyPr wrap="square" rtlCol="0">
+            <a:spAutoFit/>
+          </a:bodyPr>
+          <a:lstStyle/>
+          <a:p>
+            <a:r>
+              <a:rPr lang="en-GB" sz="2800" dirty="0">
+                <a:latin typeface="Microsoft JhengHei UI" panose="020B0604030504040204" pitchFamily="34" charset="-120"/>
+                <a:ea typeface="Microsoft JhengHei UI" panose="020B0604030504040204" pitchFamily="34" charset="-120"/>
+              </a:rPr>
+              <a:t>The Visualisations</a:t>
+            </a:r>
+          </a:p>
+        </p:txBody>
+      </p:sp>
+      <p:sp>
+        <p:nvSpPr>
+          <p:cNvPr id="32" name="TextBox 31">
+            <a:extLst>
+              <a:ext uri="{FF2B5EF4-FFF2-40B4-BE49-F238E27FC236}">
+                <a16:creationId xmlns:a16="http://schemas.microsoft.com/office/drawing/2014/main" id="{9C200D1D-F199-4632-8313-E9852CA65A5E}"/>
+              </a:ext>
+            </a:extLst>
+          </p:cNvPr>
+          <p:cNvSpPr txBox="1"/>
+          <p:nvPr/>
+        </p:nvSpPr>
+        <p:spPr>
+          <a:xfrm>
+            <a:off x="978987" y="9755378"/>
+            <a:ext cx="4599482" cy="5016758"/>
+          </a:xfrm>
+          <a:prstGeom prst="rect">
+            <a:avLst/>
+          </a:prstGeom>
+          <a:noFill/>
+        </p:spPr>
+        <p:txBody>
+          <a:bodyPr wrap="square" rtlCol="0">
+            <a:spAutoFit/>
+          </a:bodyPr>
+          <a:lstStyle/>
+          <a:p>
+            <a:pPr algn="just"/>
+            <a:r>
+              <a:rPr lang="en-GB" sz="2000" dirty="0" err="1"/>
+              <a:t>BrainBoard</a:t>
+            </a:r>
+            <a:r>
+              <a:rPr lang="en-GB" sz="2000" dirty="0"/>
+              <a:t> employs three simple plots; each providing a complementary view of the imported brain data. The first is an orthographical projection of the brain (</a:t>
+            </a:r>
+            <a:r>
+              <a:rPr lang="en-GB" sz="2000" b="1" dirty="0"/>
+              <a:t>Fig. 1</a:t>
+            </a:r>
+            <a:r>
+              <a:rPr lang="en-GB" sz="2000" dirty="0"/>
+              <a:t>), providing vital spatial context for connected regions. The second (</a:t>
+            </a:r>
+            <a:r>
+              <a:rPr lang="en-GB" sz="2000" b="1" dirty="0"/>
+              <a:t>Fig. 2</a:t>
+            </a:r>
+            <a:r>
+              <a:rPr lang="en-GB" sz="2000" dirty="0"/>
+              <a:t>) are the connections plotted in a dependency wheel diagram, providing the relative connection strengths between regions. Regions are arcs on the circumference of the plot and connections are chords cutting across the wheel area. The relative strength of the connection is conveyed by the width of its chord. Finally, </a:t>
+            </a:r>
+            <a:r>
+              <a:rPr lang="en-GB" sz="2000" b="1" dirty="0"/>
+              <a:t>Fig. 3 </a:t>
+            </a:r>
+            <a:r>
+              <a:rPr lang="en-GB" sz="2000" dirty="0"/>
+              <a:t>is a timeseries plot showing the BOLD (fMRI) signal extracted from the selected region.</a:t>
+            </a:r>
+          </a:p>
+        </p:txBody>
+      </p:sp>
+      <p:sp>
+        <p:nvSpPr>
+          <p:cNvPr id="3" name="TextBox 2">
+            <a:extLst>
+              <a:ext uri="{FF2B5EF4-FFF2-40B4-BE49-F238E27FC236}">
+                <a16:creationId xmlns:a16="http://schemas.microsoft.com/office/drawing/2014/main" id="{BEAA5ED1-6E40-4B5E-B458-03F58A299273}"/>
+              </a:ext>
+            </a:extLst>
+          </p:cNvPr>
+          <p:cNvSpPr txBox="1"/>
+          <p:nvPr/>
+        </p:nvSpPr>
+        <p:spPr>
+          <a:xfrm>
+            <a:off x="7972506" y="5391068"/>
+            <a:ext cx="758888" cy="400110"/>
+          </a:xfrm>
+          <a:prstGeom prst="rect">
+            <a:avLst/>
+          </a:prstGeom>
+          <a:noFill/>
+        </p:spPr>
+        <p:txBody>
+          <a:bodyPr wrap="square" rtlCol="0">
+            <a:spAutoFit/>
+          </a:bodyPr>
+          <a:lstStyle/>
+          <a:p>
+            <a:r>
+              <a:rPr lang="en-GB" sz="2000" b="1" dirty="0"/>
+              <a:t>Fig. 1</a:t>
+            </a:r>
+          </a:p>
+        </p:txBody>
+      </p:sp>
+      <p:sp>
+        <p:nvSpPr>
+          <p:cNvPr id="34" name="TextBox 33">
+            <a:extLst>
+              <a:ext uri="{FF2B5EF4-FFF2-40B4-BE49-F238E27FC236}">
+                <a16:creationId xmlns:a16="http://schemas.microsoft.com/office/drawing/2014/main" id="{5E1C0619-BCAE-4CBD-8E75-7307D7565CF8}"/>
+              </a:ext>
+            </a:extLst>
+          </p:cNvPr>
+          <p:cNvSpPr txBox="1"/>
+          <p:nvPr/>
+        </p:nvSpPr>
+        <p:spPr>
+          <a:xfrm>
+            <a:off x="9906911" y="14130569"/>
+            <a:ext cx="758888" cy="400110"/>
+          </a:xfrm>
+          <a:prstGeom prst="rect">
+            <a:avLst/>
+          </a:prstGeom>
+          <a:noFill/>
+        </p:spPr>
+        <p:txBody>
+          <a:bodyPr wrap="square" rtlCol="0">
+            <a:spAutoFit/>
+          </a:bodyPr>
+          <a:lstStyle/>
+          <a:p>
+            <a:r>
+              <a:rPr lang="en-GB" sz="2000" b="1" dirty="0"/>
+              <a:t>Fig. 2</a:t>
+            </a:r>
+          </a:p>
+        </p:txBody>
+      </p:sp>
+      <p:sp>
+        <p:nvSpPr>
+          <p:cNvPr id="35" name="TextBox 34">
+            <a:extLst>
+              <a:ext uri="{FF2B5EF4-FFF2-40B4-BE49-F238E27FC236}">
+                <a16:creationId xmlns:a16="http://schemas.microsoft.com/office/drawing/2014/main" id="{142C4235-3928-46A6-9CB7-1484945AA043}"/>
+              </a:ext>
+            </a:extLst>
+          </p:cNvPr>
+          <p:cNvSpPr txBox="1"/>
+          <p:nvPr/>
+        </p:nvSpPr>
+        <p:spPr>
+          <a:xfrm>
+            <a:off x="14913045" y="8456229"/>
+            <a:ext cx="758888" cy="400110"/>
+          </a:xfrm>
+          <a:prstGeom prst="rect">
+            <a:avLst/>
+          </a:prstGeom>
+          <a:noFill/>
+        </p:spPr>
+        <p:txBody>
+          <a:bodyPr wrap="square" rtlCol="0">
+            <a:spAutoFit/>
+          </a:bodyPr>
+          <a:lstStyle/>
+          <a:p>
+            <a:r>
+              <a:rPr lang="en-GB" sz="2000" b="1" dirty="0"/>
+              <a:t>Fig. 3</a:t>
+            </a:r>
+          </a:p>
+        </p:txBody>
+      </p:sp>
+      <p:sp>
+        <p:nvSpPr>
+          <p:cNvPr id="37" name="TextBox 36">
+            <a:extLst>
+              <a:ext uri="{FF2B5EF4-FFF2-40B4-BE49-F238E27FC236}">
+                <a16:creationId xmlns:a16="http://schemas.microsoft.com/office/drawing/2014/main" id="{8BB41F75-5B04-41DB-8475-5973AAA4D4D6}"/>
+              </a:ext>
+            </a:extLst>
+          </p:cNvPr>
+          <p:cNvSpPr txBox="1"/>
+          <p:nvPr/>
+        </p:nvSpPr>
+        <p:spPr>
+          <a:xfrm>
+            <a:off x="11127971" y="1716101"/>
+            <a:ext cx="3712334" cy="506990"/>
+          </a:xfrm>
+          <a:prstGeom prst="rect">
+            <a:avLst/>
+          </a:prstGeom>
+          <a:noFill/>
+        </p:spPr>
+        <p:txBody>
+          <a:bodyPr wrap="square" rtlCol="0">
+            <a:spAutoFit/>
+          </a:bodyPr>
+          <a:lstStyle/>
+          <a:p>
+            <a:r>
+              <a:rPr lang="en-GB" sz="2600" dirty="0">
+                <a:latin typeface="Microsoft JhengHei UI" panose="020B0604030504040204" pitchFamily="34" charset="-120"/>
+                <a:ea typeface="Microsoft JhengHei UI" panose="020B0604030504040204" pitchFamily="34" charset="-120"/>
+              </a:rPr>
+              <a:t>Implementation</a:t>
+            </a:r>
+          </a:p>
+        </p:txBody>
+      </p:sp>
+      <p:sp>
+        <p:nvSpPr>
+          <p:cNvPr id="38" name="Rectangle 37">
+            <a:extLst>
+              <a:ext uri="{FF2B5EF4-FFF2-40B4-BE49-F238E27FC236}">
+                <a16:creationId xmlns:a16="http://schemas.microsoft.com/office/drawing/2014/main" id="{AF9327C0-445B-4359-92E6-899B02679FAC}"/>
+              </a:ext>
+            </a:extLst>
+          </p:cNvPr>
+          <p:cNvSpPr/>
+          <p:nvPr/>
+        </p:nvSpPr>
+        <p:spPr>
+          <a:xfrm rot="5400000">
+            <a:off x="10691261" y="9678654"/>
+            <a:ext cx="5491097" cy="4724820"/>
+          </a:xfrm>
+          <a:prstGeom prst="rect">
+            <a:avLst/>
+          </a:prstGeom>
+          <a:solidFill>
+            <a:srgbClr val="E9ECEF"/>
+          </a:solidFill>
+          <a:ln>
+            <a:noFill/>
+          </a:ln>
+        </p:spPr>
+        <p:style>
+          <a:lnRef idx="2">
+            <a:schemeClr val="accent1">
+              <a:shade val="50000"/>
+            </a:schemeClr>
+          </a:lnRef>
+          <a:fillRef idx="1">
+            <a:schemeClr val="accent1"/>
+          </a:fillRef>
+          <a:effectRef idx="0">
+            <a:schemeClr val="accent1"/>
+          </a:effectRef>
+          <a:fontRef idx="minor">
+            <a:schemeClr val="lt1"/>
+          </a:fontRef>
+        </p:style>
+        <p:txBody>
+          <a:bodyPr rtlCol="0" anchor="ctr"/>
+          <a:lstStyle/>
+          <a:p>
+            <a:pPr algn="ctr"/>
+            <a:endParaRPr lang="en-GB" dirty="0"/>
+          </a:p>
+        </p:txBody>
+      </p:sp>
+      <p:sp>
+        <p:nvSpPr>
+          <p:cNvPr id="39" name="TextBox 38">
+            <a:extLst>
+              <a:ext uri="{FF2B5EF4-FFF2-40B4-BE49-F238E27FC236}">
+                <a16:creationId xmlns:a16="http://schemas.microsoft.com/office/drawing/2014/main" id="{1CE92FFB-9FDF-463D-BB05-40A68C87751D}"/>
+              </a:ext>
+            </a:extLst>
+          </p:cNvPr>
+          <p:cNvSpPr txBox="1"/>
+          <p:nvPr/>
+        </p:nvSpPr>
+        <p:spPr>
+          <a:xfrm>
+            <a:off x="11110820" y="9310118"/>
+            <a:ext cx="4087646" cy="506990"/>
+          </a:xfrm>
+          <a:prstGeom prst="rect">
+            <a:avLst/>
+          </a:prstGeom>
+          <a:noFill/>
+        </p:spPr>
+        <p:txBody>
+          <a:bodyPr wrap="square" rtlCol="0">
+            <a:spAutoFit/>
+          </a:bodyPr>
+          <a:lstStyle/>
+          <a:p>
+            <a:r>
+              <a:rPr lang="en-GB" sz="2600" dirty="0">
+                <a:latin typeface="Microsoft JhengHei UI" panose="020B0604030504040204" pitchFamily="34" charset="-120"/>
+                <a:ea typeface="Microsoft JhengHei UI" panose="020B0604030504040204" pitchFamily="34" charset="-120"/>
+              </a:rPr>
+              <a:t>Design</a:t>
+            </a:r>
+          </a:p>
+        </p:txBody>
+      </p:sp>
+      <p:sp>
+        <p:nvSpPr>
+          <p:cNvPr id="40" name="TextBox 39">
+            <a:extLst>
+              <a:ext uri="{FF2B5EF4-FFF2-40B4-BE49-F238E27FC236}">
+                <a16:creationId xmlns:a16="http://schemas.microsoft.com/office/drawing/2014/main" id="{4D5F23F3-38F2-4153-831E-2F8F604D458E}"/>
+              </a:ext>
+            </a:extLst>
+          </p:cNvPr>
+          <p:cNvSpPr txBox="1"/>
+          <p:nvPr/>
+        </p:nvSpPr>
+        <p:spPr>
+          <a:xfrm>
+            <a:off x="11074400" y="2185164"/>
+            <a:ext cx="4724819" cy="4093428"/>
+          </a:xfrm>
+          <a:prstGeom prst="rect">
+            <a:avLst/>
+          </a:prstGeom>
+          <a:noFill/>
+        </p:spPr>
+        <p:txBody>
+          <a:bodyPr wrap="square" rtlCol="0">
+            <a:spAutoFit/>
+          </a:bodyPr>
+          <a:lstStyle/>
+          <a:p>
+            <a:pPr algn="just"/>
+            <a:r>
+              <a:rPr lang="en-GB" sz="2000" dirty="0" err="1"/>
+              <a:t>BrainBoard</a:t>
+            </a:r>
+            <a:r>
+              <a:rPr lang="en-GB" sz="2000" dirty="0"/>
+              <a:t> is implemented as a web app using Vue.js for reactivity and a Vue </a:t>
+            </a:r>
+            <a:r>
+              <a:rPr lang="en-GB" sz="2000" dirty="0" err="1"/>
+              <a:t>HighCharts</a:t>
+            </a:r>
+            <a:r>
+              <a:rPr lang="en-GB" sz="2000" dirty="0"/>
+              <a:t> wrapper for the dependency wheel and timeseries plots. The orthographical projection plots are a custom implementation using SVG. The background images for each of the plot axes are blank </a:t>
+            </a:r>
+            <a:r>
+              <a:rPr lang="en-GB" sz="2000" dirty="0" err="1"/>
+              <a:t>Nilearn</a:t>
+            </a:r>
+            <a:r>
+              <a:rPr lang="en-GB" sz="2000" dirty="0"/>
+              <a:t> assets for their orthographical brain projection plots. All plots are implemented as Vue components for maximum maintainability. For speed and efficiency, JavaScript web workers are utilised to process the imported JSON files. </a:t>
+            </a:r>
+          </a:p>
+        </p:txBody>
+      </p:sp>
+      <p:sp>
+        <p:nvSpPr>
+          <p:cNvPr id="41" name="TextBox 40">
+            <a:extLst>
+              <a:ext uri="{FF2B5EF4-FFF2-40B4-BE49-F238E27FC236}">
+                <a16:creationId xmlns:a16="http://schemas.microsoft.com/office/drawing/2014/main" id="{E0224B74-531E-436B-B295-9110B5E6AD93}"/>
+              </a:ext>
+            </a:extLst>
+          </p:cNvPr>
+          <p:cNvSpPr txBox="1"/>
+          <p:nvPr/>
+        </p:nvSpPr>
+        <p:spPr>
+          <a:xfrm>
+            <a:off x="11071483" y="9739034"/>
+            <a:ext cx="4726601" cy="5016758"/>
+          </a:xfrm>
+          <a:prstGeom prst="rect">
+            <a:avLst/>
+          </a:prstGeom>
+          <a:noFill/>
+        </p:spPr>
+        <p:txBody>
+          <a:bodyPr wrap="square" rtlCol="0">
+            <a:spAutoFit/>
+          </a:bodyPr>
+          <a:lstStyle/>
+          <a:p>
+            <a:pPr algn="just"/>
+            <a:r>
+              <a:rPr lang="en-GB" sz="2000" dirty="0"/>
+              <a:t>The most important design decision in </a:t>
+            </a:r>
+            <a:r>
+              <a:rPr lang="en-GB" sz="2000" dirty="0" err="1"/>
+              <a:t>BrainBoard</a:t>
+            </a:r>
+            <a:r>
+              <a:rPr lang="en-GB" sz="2000" dirty="0"/>
+              <a:t> was to separate the presented information out into three separate plots which then synchronise during interaction as though they are all one plot. The data is separated out into three logical sections:</a:t>
+            </a:r>
+          </a:p>
+          <a:p>
+            <a:pPr algn="just"/>
+            <a:endParaRPr lang="en-GB" sz="2000" dirty="0"/>
+          </a:p>
+          <a:p>
+            <a:pPr marL="800100" lvl="1" indent="-342900" algn="just">
+              <a:buFont typeface="Arial" panose="020B0604020202020204" pitchFamily="34" charset="0"/>
+              <a:buChar char="•"/>
+            </a:pPr>
+            <a:r>
+              <a:rPr lang="en-GB" sz="2000" dirty="0"/>
+              <a:t>Region spatial coordinate data</a:t>
+            </a:r>
+          </a:p>
+          <a:p>
+            <a:pPr marL="800100" lvl="1" indent="-342900" algn="just">
+              <a:buFont typeface="Arial" panose="020B0604020202020204" pitchFamily="34" charset="0"/>
+              <a:buChar char="•"/>
+            </a:pPr>
+            <a:r>
+              <a:rPr lang="en-GB" sz="2000" dirty="0"/>
+              <a:t>Connection strength data</a:t>
+            </a:r>
+          </a:p>
+          <a:p>
+            <a:pPr marL="800100" lvl="1" indent="-342900" algn="just">
+              <a:buFont typeface="Arial" panose="020B0604020202020204" pitchFamily="34" charset="0"/>
+              <a:buChar char="•"/>
+            </a:pPr>
+            <a:r>
+              <a:rPr lang="en-GB" sz="2000" dirty="0"/>
+              <a:t>BOLD timeseries data</a:t>
+            </a:r>
+          </a:p>
+          <a:p>
+            <a:pPr algn="just"/>
+            <a:endParaRPr lang="en-GB" sz="2000" dirty="0"/>
+          </a:p>
+          <a:p>
+            <a:pPr algn="just"/>
+            <a:r>
+              <a:rPr lang="en-GB" sz="2000" dirty="0"/>
+              <a:t>Other visualisations, such as those available in </a:t>
+            </a:r>
+            <a:r>
+              <a:rPr lang="en-GB" sz="2000" dirty="0" err="1"/>
+              <a:t>Nilearn</a:t>
+            </a:r>
+            <a:r>
+              <a:rPr lang="en-GB" sz="2000" dirty="0"/>
+              <a:t>, attempt to combine the spatial and connection strength data into a single plot using transparency as an indicator of strength, we argue that this increases the …</a:t>
+            </a:r>
+          </a:p>
+        </p:txBody>
+      </p:sp>
+      <p:sp>
+        <p:nvSpPr>
+          <p:cNvPr id="42" name="TextBox 41">
+            <a:extLst>
+              <a:ext uri="{FF2B5EF4-FFF2-40B4-BE49-F238E27FC236}">
+                <a16:creationId xmlns:a16="http://schemas.microsoft.com/office/drawing/2014/main" id="{64F1DD15-6B9B-41C5-9408-AA837C5F22C3}"/>
+              </a:ext>
+            </a:extLst>
+          </p:cNvPr>
+          <p:cNvSpPr txBox="1"/>
+          <p:nvPr/>
+        </p:nvSpPr>
+        <p:spPr>
+          <a:xfrm>
+            <a:off x="16218135" y="3232354"/>
+            <a:ext cx="4087646" cy="506990"/>
+          </a:xfrm>
+          <a:prstGeom prst="rect">
+            <a:avLst/>
+          </a:prstGeom>
+          <a:noFill/>
+        </p:spPr>
+        <p:txBody>
+          <a:bodyPr wrap="square" rtlCol="0">
+            <a:spAutoFit/>
+          </a:bodyPr>
+          <a:lstStyle/>
+          <a:p>
+            <a:r>
+              <a:rPr lang="en-GB" sz="2600" dirty="0">
+                <a:solidFill>
+                  <a:schemeClr val="bg1"/>
+                </a:solidFill>
+                <a:latin typeface="Microsoft JhengHei UI" panose="020B0604030504040204" pitchFamily="34" charset="-120"/>
+                <a:ea typeface="Microsoft JhengHei UI" panose="020B0604030504040204" pitchFamily="34" charset="-120"/>
+              </a:rPr>
+              <a:t>Design Cont.</a:t>
+            </a:r>
+          </a:p>
+        </p:txBody>
+      </p:sp>
+      <p:sp>
+        <p:nvSpPr>
+          <p:cNvPr id="43" name="TextBox 42">
+            <a:extLst>
+              <a:ext uri="{FF2B5EF4-FFF2-40B4-BE49-F238E27FC236}">
+                <a16:creationId xmlns:a16="http://schemas.microsoft.com/office/drawing/2014/main" id="{DCB62589-D351-463A-A6E0-5519DFDCF2FE}"/>
+              </a:ext>
+            </a:extLst>
+          </p:cNvPr>
+          <p:cNvSpPr txBox="1"/>
+          <p:nvPr/>
+        </p:nvSpPr>
+        <p:spPr>
+          <a:xfrm>
+            <a:off x="16198685" y="3666192"/>
+            <a:ext cx="5079057" cy="9325630"/>
+          </a:xfrm>
+          <a:prstGeom prst="rect">
+            <a:avLst/>
+          </a:prstGeom>
+          <a:noFill/>
+        </p:spPr>
+        <p:txBody>
+          <a:bodyPr wrap="square" rtlCol="0">
+            <a:spAutoFit/>
+          </a:bodyPr>
+          <a:lstStyle/>
+          <a:p>
+            <a:pPr algn="just"/>
+            <a:r>
+              <a:rPr lang="en-GB" sz="2000" dirty="0">
+                <a:solidFill>
+                  <a:schemeClr val="bg1"/>
+                </a:solidFill>
+              </a:rPr>
+              <a:t>…mental workload required to generate quality insights</a:t>
+            </a:r>
+            <a:r>
+              <a:rPr lang="en-GB" sz="2000" baseline="30000" dirty="0">
+                <a:solidFill>
+                  <a:schemeClr val="bg1"/>
+                </a:solidFill>
+              </a:rPr>
+              <a:t>[3]</a:t>
+            </a:r>
+            <a:r>
+              <a:rPr lang="en-GB" sz="2000" dirty="0">
+                <a:solidFill>
+                  <a:schemeClr val="bg1"/>
+                </a:solidFill>
+              </a:rPr>
+              <a:t>. Individual views are designed to contain as little parallel information as possible so that determining which of the plots contain the desired information and discerning that information is as simple as possible. By separating the data out, users are able to compartmentalise the information much more efficiently, leading to lower time-to-insight. </a:t>
+            </a:r>
+          </a:p>
+          <a:p>
+            <a:pPr algn="just"/>
+            <a:r>
+              <a:rPr lang="en-GB" sz="2000" dirty="0">
+                <a:solidFill>
+                  <a:schemeClr val="bg1"/>
+                </a:solidFill>
+              </a:rPr>
+              <a:t>	Interactivity is a vital aspect of  </a:t>
+            </a:r>
+            <a:r>
+              <a:rPr lang="en-GB" sz="2000" dirty="0" err="1">
+                <a:solidFill>
+                  <a:schemeClr val="bg1"/>
+                </a:solidFill>
+              </a:rPr>
+              <a:t>BrainBoard</a:t>
+            </a:r>
+            <a:r>
+              <a:rPr lang="en-GB" sz="2000" dirty="0">
+                <a:solidFill>
+                  <a:schemeClr val="bg1"/>
+                </a:solidFill>
+              </a:rPr>
+              <a:t> because multiple plots build a single cohesive representation of the data. In this system, interactivity is built to be prompt, cohesive and clear and is achieved through careful colour coordination and suppression of  unrelated datapoints (</a:t>
+            </a:r>
+            <a:r>
+              <a:rPr lang="en-GB" sz="2000" b="1" dirty="0">
+                <a:solidFill>
+                  <a:schemeClr val="bg1"/>
+                </a:solidFill>
+              </a:rPr>
+              <a:t>Fig. 1, 2</a:t>
+            </a:r>
+            <a:r>
+              <a:rPr lang="en-GB" sz="2000" dirty="0">
+                <a:solidFill>
+                  <a:schemeClr val="bg1"/>
+                </a:solidFill>
+              </a:rPr>
+              <a:t>). To facilitate region location via their scientific names, tables accompany the plots containing tabulated versions of the region and connection data. These tables also interact with the rest of the system when hovered.</a:t>
+            </a:r>
+          </a:p>
+          <a:p>
+            <a:pPr algn="just"/>
+            <a:r>
+              <a:rPr lang="en-GB" sz="2000" dirty="0">
+                <a:solidFill>
+                  <a:schemeClr val="bg1"/>
+                </a:solidFill>
+              </a:rPr>
+              <a:t>	Finally, </a:t>
+            </a:r>
+            <a:r>
+              <a:rPr lang="en-GB" sz="2000" dirty="0" err="1">
+                <a:solidFill>
+                  <a:schemeClr val="bg1"/>
+                </a:solidFill>
+              </a:rPr>
+              <a:t>BrainBoard</a:t>
+            </a:r>
+            <a:r>
+              <a:rPr lang="en-GB" sz="2000" dirty="0">
+                <a:solidFill>
+                  <a:schemeClr val="bg1"/>
+                </a:solidFill>
+              </a:rPr>
+              <a:t> was built, not only be a functional and insightful visualisation of the human brain, but also to be visually appealing. Visual appeal is an important and often overlooked aspect of  information visualisation, particularly in scientific circles</a:t>
+            </a:r>
+            <a:r>
+              <a:rPr lang="en-GB" sz="2000" baseline="30000" dirty="0">
+                <a:solidFill>
+                  <a:schemeClr val="bg1"/>
+                </a:solidFill>
+              </a:rPr>
+              <a:t>[4]</a:t>
+            </a:r>
+            <a:r>
+              <a:rPr lang="en-GB" sz="2000" dirty="0">
+                <a:solidFill>
+                  <a:schemeClr val="bg1"/>
+                </a:solidFill>
+              </a:rPr>
+              <a:t>. The plots in </a:t>
+            </a:r>
+            <a:r>
+              <a:rPr lang="en-GB" sz="2000" dirty="0" err="1">
+                <a:solidFill>
+                  <a:schemeClr val="bg1"/>
+                </a:solidFill>
+              </a:rPr>
+              <a:t>BrainBoard</a:t>
+            </a:r>
+            <a:r>
+              <a:rPr lang="en-GB" sz="2000" dirty="0">
+                <a:solidFill>
+                  <a:schemeClr val="bg1"/>
+                </a:solidFill>
+              </a:rPr>
+              <a:t> possess a simple beauty which we believe will improve user engagement and lead to a greater chance of meaningful insight.</a:t>
+            </a:r>
           </a:p>
         </p:txBody>
       </p:sp>

</xml_diff>